<commit_message>
updating website for non-academic purposes
</commit_message>
<xml_diff>
--- a/icons for website.pptx
+++ b/icons for website.pptx
@@ -6,6 +6,7 @@
   </p:sldMasterIdLst>
   <p:sldIdLst>
     <p:sldId id="256" r:id="rId2"/>
+    <p:sldId id="257" r:id="rId3"/>
   </p:sldIdLst>
   <p:sldSz cx="12192000" cy="6858000"/>
   <p:notesSz cx="6858000" cy="9144000"/>
@@ -104,6 +105,11 @@
       </a:defRPr>
     </a:lvl9pPr>
   </p:defaultTextStyle>
+  <p:extLst>
+    <p:ext uri="{EFAFB233-063F-42B5-8137-9DF3F51BA10A}">
+      <p15:sldGuideLst xmlns:p15="http://schemas.microsoft.com/office/powerpoint/2012/main"/>
+    </p:ext>
+  </p:extLst>
 </p:presentation>
 </file>
 
@@ -254,7 +260,7 @@
           <a:p>
             <a:fld id="{82B814C0-76EA-A14E-895C-C3ABA0F2CBFD}" type="datetimeFigureOut">
               <a:rPr lang="en-US" smtClean="0"/>
-              <a:t>9/22/21</a:t>
+              <a:t>12/13/23</a:t>
             </a:fld>
             <a:endParaRPr lang="en-US"/>
           </a:p>
@@ -452,7 +458,7 @@
           <a:p>
             <a:fld id="{82B814C0-76EA-A14E-895C-C3ABA0F2CBFD}" type="datetimeFigureOut">
               <a:rPr lang="en-US" smtClean="0"/>
-              <a:t>9/22/21</a:t>
+              <a:t>12/13/23</a:t>
             </a:fld>
             <a:endParaRPr lang="en-US"/>
           </a:p>
@@ -660,7 +666,7 @@
           <a:p>
             <a:fld id="{82B814C0-76EA-A14E-895C-C3ABA0F2CBFD}" type="datetimeFigureOut">
               <a:rPr lang="en-US" smtClean="0"/>
-              <a:t>9/22/21</a:t>
+              <a:t>12/13/23</a:t>
             </a:fld>
             <a:endParaRPr lang="en-US"/>
           </a:p>
@@ -858,7 +864,7 @@
           <a:p>
             <a:fld id="{82B814C0-76EA-A14E-895C-C3ABA0F2CBFD}" type="datetimeFigureOut">
               <a:rPr lang="en-US" smtClean="0"/>
-              <a:t>9/22/21</a:t>
+              <a:t>12/13/23</a:t>
             </a:fld>
             <a:endParaRPr lang="en-US"/>
           </a:p>
@@ -1133,7 +1139,7 @@
           <a:p>
             <a:fld id="{82B814C0-76EA-A14E-895C-C3ABA0F2CBFD}" type="datetimeFigureOut">
               <a:rPr lang="en-US" smtClean="0"/>
-              <a:t>9/22/21</a:t>
+              <a:t>12/13/23</a:t>
             </a:fld>
             <a:endParaRPr lang="en-US"/>
           </a:p>
@@ -1398,7 +1404,7 @@
           <a:p>
             <a:fld id="{82B814C0-76EA-A14E-895C-C3ABA0F2CBFD}" type="datetimeFigureOut">
               <a:rPr lang="en-US" smtClean="0"/>
-              <a:t>9/22/21</a:t>
+              <a:t>12/13/23</a:t>
             </a:fld>
             <a:endParaRPr lang="en-US"/>
           </a:p>
@@ -1810,7 +1816,7 @@
           <a:p>
             <a:fld id="{82B814C0-76EA-A14E-895C-C3ABA0F2CBFD}" type="datetimeFigureOut">
               <a:rPr lang="en-US" smtClean="0"/>
-              <a:t>9/22/21</a:t>
+              <a:t>12/13/23</a:t>
             </a:fld>
             <a:endParaRPr lang="en-US"/>
           </a:p>
@@ -1951,7 +1957,7 @@
           <a:p>
             <a:fld id="{82B814C0-76EA-A14E-895C-C3ABA0F2CBFD}" type="datetimeFigureOut">
               <a:rPr lang="en-US" smtClean="0"/>
-              <a:t>9/22/21</a:t>
+              <a:t>12/13/23</a:t>
             </a:fld>
             <a:endParaRPr lang="en-US"/>
           </a:p>
@@ -2064,7 +2070,7 @@
           <a:p>
             <a:fld id="{82B814C0-76EA-A14E-895C-C3ABA0F2CBFD}" type="datetimeFigureOut">
               <a:rPr lang="en-US" smtClean="0"/>
-              <a:t>9/22/21</a:t>
+              <a:t>12/13/23</a:t>
             </a:fld>
             <a:endParaRPr lang="en-US"/>
           </a:p>
@@ -2375,7 +2381,7 @@
           <a:p>
             <a:fld id="{82B814C0-76EA-A14E-895C-C3ABA0F2CBFD}" type="datetimeFigureOut">
               <a:rPr lang="en-US" smtClean="0"/>
-              <a:t>9/22/21</a:t>
+              <a:t>12/13/23</a:t>
             </a:fld>
             <a:endParaRPr lang="en-US"/>
           </a:p>
@@ -2663,7 +2669,7 @@
           <a:p>
             <a:fld id="{82B814C0-76EA-A14E-895C-C3ABA0F2CBFD}" type="datetimeFigureOut">
               <a:rPr lang="en-US" smtClean="0"/>
-              <a:t>9/22/21</a:t>
+              <a:t>12/13/23</a:t>
             </a:fld>
             <a:endParaRPr lang="en-US"/>
           </a:p>
@@ -2904,7 +2910,7 @@
           <a:p>
             <a:fld id="{82B814C0-76EA-A14E-895C-C3ABA0F2CBFD}" type="datetimeFigureOut">
               <a:rPr lang="en-US" smtClean="0"/>
-              <a:t>9/22/21</a:t>
+              <a:t>12/13/23</a:t>
             </a:fld>
             <a:endParaRPr lang="en-US"/>
           </a:p>
@@ -4102,6 +4108,1233 @@
 </p:sld>
 </file>
 
+<file path=ppt/slides/slide2.xml><?xml version="1.0" encoding="utf-8"?>
+<p:sld xmlns:a="http://schemas.openxmlformats.org/drawingml/2006/main" xmlns:r="http://schemas.openxmlformats.org/officeDocument/2006/relationships" xmlns:p="http://schemas.openxmlformats.org/presentationml/2006/main">
+  <p:cSld>
+    <p:spTree>
+      <p:nvGrpSpPr>
+        <p:cNvPr id="1" name=""/>
+        <p:cNvGrpSpPr/>
+        <p:nvPr/>
+      </p:nvGrpSpPr>
+      <p:grpSpPr>
+        <a:xfrm>
+          <a:off x="0" y="0"/>
+          <a:ext cx="0" cy="0"/>
+          <a:chOff x="0" y="0"/>
+          <a:chExt cx="0" cy="0"/>
+        </a:xfrm>
+      </p:grpSpPr>
+      <p:grpSp>
+        <p:nvGrpSpPr>
+          <p:cNvPr id="78" name="Group 77">
+            <a:extLst>
+              <a:ext uri="{FF2B5EF4-FFF2-40B4-BE49-F238E27FC236}">
+                <a16:creationId xmlns:a16="http://schemas.microsoft.com/office/drawing/2014/main" id="{CD0B6258-0B6D-AC18-E217-B84331DA789E}"/>
+              </a:ext>
+            </a:extLst>
+          </p:cNvPr>
+          <p:cNvGrpSpPr/>
+          <p:nvPr/>
+        </p:nvGrpSpPr>
+        <p:grpSpPr>
+          <a:xfrm>
+            <a:off x="472004" y="-310112"/>
+            <a:ext cx="6524441" cy="7728912"/>
+            <a:chOff x="472004" y="-310112"/>
+            <a:chExt cx="6524441" cy="7728912"/>
+          </a:xfrm>
+        </p:grpSpPr>
+        <p:sp>
+          <p:nvSpPr>
+            <p:cNvPr id="71" name="Arc 70">
+              <a:extLst>
+                <a:ext uri="{FF2B5EF4-FFF2-40B4-BE49-F238E27FC236}">
+                  <a16:creationId xmlns:a16="http://schemas.microsoft.com/office/drawing/2014/main" id="{93224D58-01AA-351F-C6B4-0F444CB37BC4}"/>
+                </a:ext>
+              </a:extLst>
+            </p:cNvPr>
+            <p:cNvSpPr/>
+            <p:nvPr/>
+          </p:nvSpPr>
+          <p:spPr>
+            <a:xfrm rot="19010981">
+              <a:off x="1031334" y="1300802"/>
+              <a:ext cx="5489973" cy="6117998"/>
+            </a:xfrm>
+            <a:prstGeom prst="arc">
+              <a:avLst>
+                <a:gd name="adj1" fmla="val 16611416"/>
+                <a:gd name="adj2" fmla="val 20431914"/>
+              </a:avLst>
+            </a:prstGeom>
+            <a:ln w="44450">
+              <a:solidFill>
+                <a:schemeClr val="tx1"/>
+              </a:solidFill>
+              <a:headEnd w="lg" len="med"/>
+              <a:tailEnd type="triangle" w="lg" len="med"/>
+            </a:ln>
+          </p:spPr>
+          <p:style>
+            <a:lnRef idx="1">
+              <a:schemeClr val="accent1"/>
+            </a:lnRef>
+            <a:fillRef idx="0">
+              <a:schemeClr val="accent1"/>
+            </a:fillRef>
+            <a:effectRef idx="0">
+              <a:schemeClr val="accent1"/>
+            </a:effectRef>
+            <a:fontRef idx="minor">
+              <a:schemeClr val="tx1"/>
+            </a:fontRef>
+          </p:style>
+          <p:txBody>
+            <a:bodyPr rtlCol="0" anchor="ctr"/>
+            <a:lstStyle/>
+            <a:p>
+              <a:pPr algn="ctr"/>
+              <a:endParaRPr lang="en-US"/>
+            </a:p>
+          </p:txBody>
+        </p:sp>
+        <p:sp>
+          <p:nvSpPr>
+            <p:cNvPr id="72" name="Arc 71">
+              <a:extLst>
+                <a:ext uri="{FF2B5EF4-FFF2-40B4-BE49-F238E27FC236}">
+                  <a16:creationId xmlns:a16="http://schemas.microsoft.com/office/drawing/2014/main" id="{E9D91B40-2EF4-3789-0EC0-5509B74F9B7F}"/>
+                </a:ext>
+              </a:extLst>
+            </p:cNvPr>
+            <p:cNvSpPr/>
+            <p:nvPr/>
+          </p:nvSpPr>
+          <p:spPr>
+            <a:xfrm rot="8212842">
+              <a:off x="472004" y="-310112"/>
+              <a:ext cx="5489973" cy="6117998"/>
+            </a:xfrm>
+            <a:prstGeom prst="arc">
+              <a:avLst>
+                <a:gd name="adj1" fmla="val 16611416"/>
+                <a:gd name="adj2" fmla="val 20431914"/>
+              </a:avLst>
+            </a:prstGeom>
+            <a:ln w="44450">
+              <a:solidFill>
+                <a:schemeClr val="tx1"/>
+              </a:solidFill>
+              <a:tailEnd type="triangle" w="lg" len="med"/>
+            </a:ln>
+          </p:spPr>
+          <p:style>
+            <a:lnRef idx="1">
+              <a:schemeClr val="accent1"/>
+            </a:lnRef>
+            <a:fillRef idx="0">
+              <a:schemeClr val="accent1"/>
+            </a:fillRef>
+            <a:effectRef idx="0">
+              <a:schemeClr val="accent1"/>
+            </a:effectRef>
+            <a:fontRef idx="minor">
+              <a:schemeClr val="tx1"/>
+            </a:fontRef>
+          </p:style>
+          <p:txBody>
+            <a:bodyPr rtlCol="0" anchor="ctr"/>
+            <a:lstStyle/>
+            <a:p>
+              <a:pPr algn="ctr"/>
+              <a:endParaRPr lang="en-US"/>
+            </a:p>
+          </p:txBody>
+        </p:sp>
+        <p:grpSp>
+          <p:nvGrpSpPr>
+            <p:cNvPr id="77" name="Group 76">
+              <a:extLst>
+                <a:ext uri="{FF2B5EF4-FFF2-40B4-BE49-F238E27FC236}">
+                  <a16:creationId xmlns:a16="http://schemas.microsoft.com/office/drawing/2014/main" id="{1F70B63A-4DC8-46AC-07B4-293B0CA54C95}"/>
+                </a:ext>
+              </a:extLst>
+            </p:cNvPr>
+            <p:cNvGrpSpPr/>
+            <p:nvPr/>
+          </p:nvGrpSpPr>
+          <p:grpSpPr>
+            <a:xfrm>
+              <a:off x="672252" y="1975667"/>
+              <a:ext cx="6324193" cy="2991178"/>
+              <a:chOff x="672252" y="1975667"/>
+              <a:chExt cx="6324193" cy="2991178"/>
+            </a:xfrm>
+          </p:grpSpPr>
+          <p:sp>
+            <p:nvSpPr>
+              <p:cNvPr id="39" name="TextBox 38">
+                <a:extLst>
+                  <a:ext uri="{FF2B5EF4-FFF2-40B4-BE49-F238E27FC236}">
+                    <a16:creationId xmlns:a16="http://schemas.microsoft.com/office/drawing/2014/main" id="{7708DEF7-08A5-9547-B5D9-91342119FE3F}"/>
+                  </a:ext>
+                </a:extLst>
+              </p:cNvPr>
+              <p:cNvSpPr txBox="1"/>
+              <p:nvPr/>
+            </p:nvSpPr>
+            <p:spPr>
+              <a:xfrm>
+                <a:off x="707656" y="2001279"/>
+                <a:ext cx="1718841" cy="461665"/>
+              </a:xfrm>
+              <a:prstGeom prst="rect">
+                <a:avLst/>
+              </a:prstGeom>
+              <a:noFill/>
+            </p:spPr>
+            <p:txBody>
+              <a:bodyPr wrap="square" rtlCol="0">
+                <a:spAutoFit/>
+              </a:bodyPr>
+              <a:lstStyle/>
+              <a:p>
+                <a:pPr algn="ctr"/>
+                <a:r>
+                  <a:rPr lang="en-US" sz="2400" dirty="0">
+                    <a:solidFill>
+                      <a:schemeClr val="accent2">
+                        <a:lumMod val="75000"/>
+                      </a:schemeClr>
+                    </a:solidFill>
+                    <a:latin typeface="Franklin Gothic Book" panose="020B0503020102020204" pitchFamily="34" charset="0"/>
+                  </a:rPr>
+                  <a:t>Questioned</a:t>
+                </a:r>
+                <a:endParaRPr lang="en-US" sz="2400" dirty="0">
+                  <a:solidFill>
+                    <a:srgbClr val="C00000"/>
+                  </a:solidFill>
+                  <a:latin typeface="Franklin Gothic Book" panose="020B0503020102020204" pitchFamily="34" charset="0"/>
+                </a:endParaRPr>
+              </a:p>
+            </p:txBody>
+          </p:sp>
+          <p:grpSp>
+            <p:nvGrpSpPr>
+              <p:cNvPr id="40" name="Group 39">
+                <a:extLst>
+                  <a:ext uri="{FF2B5EF4-FFF2-40B4-BE49-F238E27FC236}">
+                    <a16:creationId xmlns:a16="http://schemas.microsoft.com/office/drawing/2014/main" id="{DD44CAA6-0E80-AD5D-E366-976B35155116}"/>
+                  </a:ext>
+                </a:extLst>
+              </p:cNvPr>
+              <p:cNvGrpSpPr/>
+              <p:nvPr/>
+            </p:nvGrpSpPr>
+            <p:grpSpPr>
+              <a:xfrm>
+                <a:off x="672252" y="3833880"/>
+                <a:ext cx="685799" cy="1132965"/>
+                <a:chOff x="914401" y="3295366"/>
+                <a:chExt cx="972766" cy="1575881"/>
+              </a:xfrm>
+              <a:solidFill>
+                <a:schemeClr val="bg1">
+                  <a:lumMod val="65000"/>
+                </a:schemeClr>
+              </a:solidFill>
+            </p:grpSpPr>
+            <p:sp>
+              <p:nvSpPr>
+                <p:cNvPr id="41" name="Oval 40">
+                  <a:extLst>
+                    <a:ext uri="{FF2B5EF4-FFF2-40B4-BE49-F238E27FC236}">
+                      <a16:creationId xmlns:a16="http://schemas.microsoft.com/office/drawing/2014/main" id="{75A9AFE5-F3EB-F62C-7A82-F04317B54C94}"/>
+                    </a:ext>
+                  </a:extLst>
+                </p:cNvPr>
+                <p:cNvSpPr/>
+                <p:nvPr/>
+              </p:nvSpPr>
+              <p:spPr>
+                <a:xfrm>
+                  <a:off x="1035024" y="3295366"/>
+                  <a:ext cx="731520" cy="731520"/>
+                </a:xfrm>
+                <a:prstGeom prst="ellipse">
+                  <a:avLst/>
+                </a:prstGeom>
+                <a:solidFill>
+                  <a:srgbClr val="8E8E8E"/>
+                </a:solidFill>
+                <a:ln>
+                  <a:solidFill>
+                    <a:schemeClr val="tx1"/>
+                  </a:solidFill>
+                </a:ln>
+              </p:spPr>
+              <p:style>
+                <a:lnRef idx="2">
+                  <a:schemeClr val="accent1">
+                    <a:shade val="50000"/>
+                  </a:schemeClr>
+                </a:lnRef>
+                <a:fillRef idx="1">
+                  <a:schemeClr val="accent1"/>
+                </a:fillRef>
+                <a:effectRef idx="0">
+                  <a:schemeClr val="accent1"/>
+                </a:effectRef>
+                <a:fontRef idx="minor">
+                  <a:schemeClr val="lt1"/>
+                </a:fontRef>
+              </p:style>
+              <p:txBody>
+                <a:bodyPr rtlCol="0" anchor="ctr"/>
+                <a:lstStyle/>
+                <a:p>
+                  <a:pPr algn="ctr"/>
+                  <a:endParaRPr lang="en-US" dirty="0"/>
+                </a:p>
+              </p:txBody>
+            </p:sp>
+            <p:sp>
+              <p:nvSpPr>
+                <p:cNvPr id="42" name="Round Same Side Corner Rectangle 41">
+                  <a:extLst>
+                    <a:ext uri="{FF2B5EF4-FFF2-40B4-BE49-F238E27FC236}">
+                      <a16:creationId xmlns:a16="http://schemas.microsoft.com/office/drawing/2014/main" id="{1E4BD199-9938-6972-4F86-0F43CF0500AD}"/>
+                    </a:ext>
+                  </a:extLst>
+                </p:cNvPr>
+                <p:cNvSpPr/>
+                <p:nvPr/>
+              </p:nvSpPr>
+              <p:spPr>
+                <a:xfrm>
+                  <a:off x="914401" y="4026886"/>
+                  <a:ext cx="972766" cy="844361"/>
+                </a:xfrm>
+                <a:prstGeom prst="round2SameRect">
+                  <a:avLst>
+                    <a:gd name="adj1" fmla="val 50000"/>
+                    <a:gd name="adj2" fmla="val 0"/>
+                  </a:avLst>
+                </a:prstGeom>
+                <a:solidFill>
+                  <a:srgbClr val="8E8E8E"/>
+                </a:solidFill>
+                <a:ln>
+                  <a:solidFill>
+                    <a:schemeClr val="tx1"/>
+                  </a:solidFill>
+                </a:ln>
+              </p:spPr>
+              <p:style>
+                <a:lnRef idx="2">
+                  <a:schemeClr val="accent1">
+                    <a:shade val="50000"/>
+                  </a:schemeClr>
+                </a:lnRef>
+                <a:fillRef idx="1">
+                  <a:schemeClr val="accent1"/>
+                </a:fillRef>
+                <a:effectRef idx="0">
+                  <a:schemeClr val="accent1"/>
+                </a:effectRef>
+                <a:fontRef idx="minor">
+                  <a:schemeClr val="lt1"/>
+                </a:fontRef>
+              </p:style>
+              <p:txBody>
+                <a:bodyPr rtlCol="0" anchor="ctr"/>
+                <a:lstStyle/>
+                <a:p>
+                  <a:pPr algn="ctr"/>
+                  <a:endParaRPr lang="en-US" dirty="0"/>
+                </a:p>
+              </p:txBody>
+            </p:sp>
+          </p:grpSp>
+          <p:grpSp>
+            <p:nvGrpSpPr>
+              <p:cNvPr id="43" name="Group 42">
+                <a:extLst>
+                  <a:ext uri="{FF2B5EF4-FFF2-40B4-BE49-F238E27FC236}">
+                    <a16:creationId xmlns:a16="http://schemas.microsoft.com/office/drawing/2014/main" id="{7D55A67E-A566-957C-4FBF-8866ABD97D0B}"/>
+                  </a:ext>
+                </a:extLst>
+              </p:cNvPr>
+              <p:cNvGrpSpPr/>
+              <p:nvPr/>
+            </p:nvGrpSpPr>
+            <p:grpSpPr>
+              <a:xfrm>
+                <a:off x="1963170" y="3833880"/>
+                <a:ext cx="685799" cy="1132965"/>
+                <a:chOff x="914401" y="3295366"/>
+                <a:chExt cx="972766" cy="1575881"/>
+              </a:xfrm>
+              <a:solidFill>
+                <a:schemeClr val="bg1">
+                  <a:lumMod val="85000"/>
+                </a:schemeClr>
+              </a:solidFill>
+            </p:grpSpPr>
+            <p:sp>
+              <p:nvSpPr>
+                <p:cNvPr id="44" name="Oval 43">
+                  <a:extLst>
+                    <a:ext uri="{FF2B5EF4-FFF2-40B4-BE49-F238E27FC236}">
+                      <a16:creationId xmlns:a16="http://schemas.microsoft.com/office/drawing/2014/main" id="{8DA56033-4DEC-357E-B554-1610A0219945}"/>
+                    </a:ext>
+                  </a:extLst>
+                </p:cNvPr>
+                <p:cNvSpPr/>
+                <p:nvPr/>
+              </p:nvSpPr>
+              <p:spPr>
+                <a:xfrm>
+                  <a:off x="1035024" y="3295366"/>
+                  <a:ext cx="731520" cy="731520"/>
+                </a:xfrm>
+                <a:prstGeom prst="ellipse">
+                  <a:avLst/>
+                </a:prstGeom>
+                <a:solidFill>
+                  <a:schemeClr val="bg2">
+                    <a:lumMod val="90000"/>
+                  </a:schemeClr>
+                </a:solidFill>
+                <a:ln>
+                  <a:solidFill>
+                    <a:schemeClr val="tx1"/>
+                  </a:solidFill>
+                </a:ln>
+              </p:spPr>
+              <p:style>
+                <a:lnRef idx="2">
+                  <a:schemeClr val="accent1">
+                    <a:shade val="50000"/>
+                  </a:schemeClr>
+                </a:lnRef>
+                <a:fillRef idx="1">
+                  <a:schemeClr val="accent1"/>
+                </a:fillRef>
+                <a:effectRef idx="0">
+                  <a:schemeClr val="accent1"/>
+                </a:effectRef>
+                <a:fontRef idx="minor">
+                  <a:schemeClr val="lt1"/>
+                </a:fontRef>
+              </p:style>
+              <p:txBody>
+                <a:bodyPr rtlCol="0" anchor="ctr"/>
+                <a:lstStyle/>
+                <a:p>
+                  <a:pPr algn="ctr"/>
+                  <a:endParaRPr lang="en-US"/>
+                </a:p>
+              </p:txBody>
+            </p:sp>
+            <p:sp>
+              <p:nvSpPr>
+                <p:cNvPr id="45" name="Round Same Side Corner Rectangle 44">
+                  <a:extLst>
+                    <a:ext uri="{FF2B5EF4-FFF2-40B4-BE49-F238E27FC236}">
+                      <a16:creationId xmlns:a16="http://schemas.microsoft.com/office/drawing/2014/main" id="{2C31F685-0822-D7D0-77F1-91DF1C351A1D}"/>
+                    </a:ext>
+                  </a:extLst>
+                </p:cNvPr>
+                <p:cNvSpPr/>
+                <p:nvPr/>
+              </p:nvSpPr>
+              <p:spPr>
+                <a:xfrm>
+                  <a:off x="914401" y="4026886"/>
+                  <a:ext cx="972766" cy="844361"/>
+                </a:xfrm>
+                <a:prstGeom prst="round2SameRect">
+                  <a:avLst>
+                    <a:gd name="adj1" fmla="val 50000"/>
+                    <a:gd name="adj2" fmla="val 0"/>
+                  </a:avLst>
+                </a:prstGeom>
+                <a:solidFill>
+                  <a:schemeClr val="bg2">
+                    <a:lumMod val="90000"/>
+                  </a:schemeClr>
+                </a:solidFill>
+                <a:ln>
+                  <a:solidFill>
+                    <a:schemeClr val="tx1"/>
+                  </a:solidFill>
+                </a:ln>
+              </p:spPr>
+              <p:style>
+                <a:lnRef idx="2">
+                  <a:schemeClr val="accent1">
+                    <a:shade val="50000"/>
+                  </a:schemeClr>
+                </a:lnRef>
+                <a:fillRef idx="1">
+                  <a:schemeClr val="accent1"/>
+                </a:fillRef>
+                <a:effectRef idx="0">
+                  <a:schemeClr val="accent1"/>
+                </a:effectRef>
+                <a:fontRef idx="minor">
+                  <a:schemeClr val="lt1"/>
+                </a:fontRef>
+              </p:style>
+              <p:txBody>
+                <a:bodyPr rtlCol="0" anchor="ctr"/>
+                <a:lstStyle/>
+                <a:p>
+                  <a:pPr algn="ctr"/>
+                  <a:endParaRPr lang="en-US"/>
+                </a:p>
+              </p:txBody>
+            </p:sp>
+          </p:grpSp>
+          <p:sp>
+            <p:nvSpPr>
+              <p:cNvPr id="46" name="Oval 45">
+                <a:extLst>
+                  <a:ext uri="{FF2B5EF4-FFF2-40B4-BE49-F238E27FC236}">
+                    <a16:creationId xmlns:a16="http://schemas.microsoft.com/office/drawing/2014/main" id="{25A7CAEA-D72C-7F46-3E11-0B3E9D3589B2}"/>
+                  </a:ext>
+                </a:extLst>
+              </p:cNvPr>
+              <p:cNvSpPr/>
+              <p:nvPr/>
+            </p:nvSpPr>
+            <p:spPr>
+              <a:xfrm>
+                <a:off x="1021874" y="4048415"/>
+                <a:ext cx="45720" cy="45720"/>
+              </a:xfrm>
+              <a:prstGeom prst="ellipse">
+                <a:avLst/>
+              </a:prstGeom>
+              <a:solidFill>
+                <a:schemeClr val="tx1"/>
+              </a:solidFill>
+              <a:ln>
+                <a:solidFill>
+                  <a:schemeClr val="tx1"/>
+                </a:solidFill>
+              </a:ln>
+            </p:spPr>
+            <p:style>
+              <a:lnRef idx="2">
+                <a:schemeClr val="accent1">
+                  <a:shade val="50000"/>
+                </a:schemeClr>
+              </a:lnRef>
+              <a:fillRef idx="1">
+                <a:schemeClr val="accent1"/>
+              </a:fillRef>
+              <a:effectRef idx="0">
+                <a:schemeClr val="accent1"/>
+              </a:effectRef>
+              <a:fontRef idx="minor">
+                <a:schemeClr val="lt1"/>
+              </a:fontRef>
+            </p:style>
+            <p:txBody>
+              <a:bodyPr rtlCol="0" anchor="ctr"/>
+              <a:lstStyle/>
+              <a:p>
+                <a:pPr algn="ctr"/>
+                <a:endParaRPr lang="en-US"/>
+              </a:p>
+            </p:txBody>
+          </p:sp>
+          <p:sp>
+            <p:nvSpPr>
+              <p:cNvPr id="47" name="Oval 46">
+                <a:extLst>
+                  <a:ext uri="{FF2B5EF4-FFF2-40B4-BE49-F238E27FC236}">
+                    <a16:creationId xmlns:a16="http://schemas.microsoft.com/office/drawing/2014/main" id="{EAE88528-3887-4524-7A3E-81D80AD652DF}"/>
+                  </a:ext>
+                </a:extLst>
+              </p:cNvPr>
+              <p:cNvSpPr/>
+              <p:nvPr/>
+            </p:nvSpPr>
+            <p:spPr>
+              <a:xfrm>
+                <a:off x="1174274" y="4032565"/>
+                <a:ext cx="45720" cy="45720"/>
+              </a:xfrm>
+              <a:prstGeom prst="ellipse">
+                <a:avLst/>
+              </a:prstGeom>
+              <a:solidFill>
+                <a:schemeClr val="tx1"/>
+              </a:solidFill>
+              <a:ln>
+                <a:solidFill>
+                  <a:schemeClr val="tx1"/>
+                </a:solidFill>
+              </a:ln>
+            </p:spPr>
+            <p:style>
+              <a:lnRef idx="2">
+                <a:schemeClr val="accent1">
+                  <a:shade val="50000"/>
+                </a:schemeClr>
+              </a:lnRef>
+              <a:fillRef idx="1">
+                <a:schemeClr val="accent1"/>
+              </a:fillRef>
+              <a:effectRef idx="0">
+                <a:schemeClr val="accent1"/>
+              </a:effectRef>
+              <a:fontRef idx="minor">
+                <a:schemeClr val="lt1"/>
+              </a:fontRef>
+            </p:style>
+            <p:txBody>
+              <a:bodyPr rtlCol="0" anchor="ctr"/>
+              <a:lstStyle/>
+              <a:p>
+                <a:pPr algn="ctr"/>
+                <a:endParaRPr lang="en-US"/>
+              </a:p>
+            </p:txBody>
+          </p:sp>
+          <p:sp>
+            <p:nvSpPr>
+              <p:cNvPr id="48" name="Oval 47">
+                <a:extLst>
+                  <a:ext uri="{FF2B5EF4-FFF2-40B4-BE49-F238E27FC236}">
+                    <a16:creationId xmlns:a16="http://schemas.microsoft.com/office/drawing/2014/main" id="{92CE5B08-E3D7-982B-606B-815B736A8A04}"/>
+                  </a:ext>
+                </a:extLst>
+              </p:cNvPr>
+              <p:cNvSpPr/>
+              <p:nvPr/>
+            </p:nvSpPr>
+            <p:spPr>
+              <a:xfrm>
+                <a:off x="2267092" y="4039120"/>
+                <a:ext cx="45720" cy="45720"/>
+              </a:xfrm>
+              <a:prstGeom prst="ellipse">
+                <a:avLst/>
+              </a:prstGeom>
+              <a:solidFill>
+                <a:schemeClr val="tx1"/>
+              </a:solidFill>
+              <a:ln>
+                <a:solidFill>
+                  <a:schemeClr val="tx1"/>
+                </a:solidFill>
+              </a:ln>
+            </p:spPr>
+            <p:style>
+              <a:lnRef idx="2">
+                <a:schemeClr val="accent1">
+                  <a:shade val="50000"/>
+                </a:schemeClr>
+              </a:lnRef>
+              <a:fillRef idx="1">
+                <a:schemeClr val="accent1"/>
+              </a:fillRef>
+              <a:effectRef idx="0">
+                <a:schemeClr val="accent1"/>
+              </a:effectRef>
+              <a:fontRef idx="minor">
+                <a:schemeClr val="lt1"/>
+              </a:fontRef>
+            </p:style>
+            <p:txBody>
+              <a:bodyPr rtlCol="0" anchor="ctr"/>
+              <a:lstStyle/>
+              <a:p>
+                <a:pPr algn="ctr"/>
+                <a:endParaRPr lang="en-US"/>
+              </a:p>
+            </p:txBody>
+          </p:sp>
+          <p:sp>
+            <p:nvSpPr>
+              <p:cNvPr id="49" name="Oval 48">
+                <a:extLst>
+                  <a:ext uri="{FF2B5EF4-FFF2-40B4-BE49-F238E27FC236}">
+                    <a16:creationId xmlns:a16="http://schemas.microsoft.com/office/drawing/2014/main" id="{13762536-4C00-103D-6D8A-8DF6E8DB7595}"/>
+                  </a:ext>
+                </a:extLst>
+              </p:cNvPr>
+              <p:cNvSpPr/>
+              <p:nvPr/>
+            </p:nvSpPr>
+            <p:spPr>
+              <a:xfrm>
+                <a:off x="2112832" y="4029827"/>
+                <a:ext cx="45720" cy="45720"/>
+              </a:xfrm>
+              <a:prstGeom prst="ellipse">
+                <a:avLst/>
+              </a:prstGeom>
+              <a:solidFill>
+                <a:schemeClr val="tx1"/>
+              </a:solidFill>
+              <a:ln>
+                <a:solidFill>
+                  <a:schemeClr val="tx1"/>
+                </a:solidFill>
+              </a:ln>
+            </p:spPr>
+            <p:style>
+              <a:lnRef idx="2">
+                <a:schemeClr val="accent1">
+                  <a:shade val="50000"/>
+                </a:schemeClr>
+              </a:lnRef>
+              <a:fillRef idx="1">
+                <a:schemeClr val="accent1"/>
+              </a:fillRef>
+              <a:effectRef idx="0">
+                <a:schemeClr val="accent1"/>
+              </a:effectRef>
+              <a:fontRef idx="minor">
+                <a:schemeClr val="lt1"/>
+              </a:fontRef>
+            </p:style>
+            <p:txBody>
+              <a:bodyPr rtlCol="0" anchor="ctr"/>
+              <a:lstStyle/>
+              <a:p>
+                <a:pPr algn="ctr"/>
+                <a:endParaRPr lang="en-US"/>
+              </a:p>
+            </p:txBody>
+          </p:sp>
+          <p:sp>
+            <p:nvSpPr>
+              <p:cNvPr id="50" name="Oval Callout 49">
+                <a:extLst>
+                  <a:ext uri="{FF2B5EF4-FFF2-40B4-BE49-F238E27FC236}">
+                    <a16:creationId xmlns:a16="http://schemas.microsoft.com/office/drawing/2014/main" id="{BF808541-6A12-67CF-9C91-DF778AAFF476}"/>
+                  </a:ext>
+                </a:extLst>
+              </p:cNvPr>
+              <p:cNvSpPr/>
+              <p:nvPr/>
+            </p:nvSpPr>
+            <p:spPr>
+              <a:xfrm>
+                <a:off x="1455568" y="3350520"/>
+                <a:ext cx="550122" cy="531097"/>
+              </a:xfrm>
+              <a:prstGeom prst="wedgeEllipseCallout">
+                <a:avLst>
+                  <a:gd name="adj1" fmla="val 52048"/>
+                  <a:gd name="adj2" fmla="val 53402"/>
+                </a:avLst>
+              </a:prstGeom>
+              <a:solidFill>
+                <a:schemeClr val="accent2">
+                  <a:lumMod val="75000"/>
+                </a:schemeClr>
+              </a:solidFill>
+              <a:ln>
+                <a:solidFill>
+                  <a:schemeClr val="accent2">
+                    <a:lumMod val="75000"/>
+                  </a:schemeClr>
+                </a:solidFill>
+              </a:ln>
+            </p:spPr>
+            <p:style>
+              <a:lnRef idx="2">
+                <a:schemeClr val="accent1">
+                  <a:shade val="50000"/>
+                </a:schemeClr>
+              </a:lnRef>
+              <a:fillRef idx="1">
+                <a:schemeClr val="accent1"/>
+              </a:fillRef>
+              <a:effectRef idx="0">
+                <a:schemeClr val="accent1"/>
+              </a:effectRef>
+              <a:fontRef idx="minor">
+                <a:schemeClr val="lt1"/>
+              </a:fontRef>
+            </p:style>
+            <p:txBody>
+              <a:bodyPr rtlCol="0" anchor="ctr"/>
+              <a:lstStyle/>
+              <a:p>
+                <a:pPr algn="ctr"/>
+                <a:endParaRPr lang="en-US"/>
+              </a:p>
+            </p:txBody>
+          </p:sp>
+          <p:sp>
+            <p:nvSpPr>
+              <p:cNvPr id="51" name="Cloud Callout 50">
+                <a:extLst>
+                  <a:ext uri="{FF2B5EF4-FFF2-40B4-BE49-F238E27FC236}">
+                    <a16:creationId xmlns:a16="http://schemas.microsoft.com/office/drawing/2014/main" id="{166095A5-8FA1-EE13-37E9-C77E35D3124C}"/>
+                  </a:ext>
+                </a:extLst>
+              </p:cNvPr>
+              <p:cNvSpPr/>
+              <p:nvPr/>
+            </p:nvSpPr>
+            <p:spPr>
+              <a:xfrm>
+                <a:off x="2563930" y="3116275"/>
+                <a:ext cx="763897" cy="608699"/>
+              </a:xfrm>
+              <a:prstGeom prst="cloudCallout">
+                <a:avLst>
+                  <a:gd name="adj1" fmla="val -45197"/>
+                  <a:gd name="adj2" fmla="val 63829"/>
+                </a:avLst>
+              </a:prstGeom>
+              <a:solidFill>
+                <a:srgbClr val="C00000"/>
+              </a:solidFill>
+              <a:ln>
+                <a:solidFill>
+                  <a:srgbClr val="C00000"/>
+                </a:solidFill>
+              </a:ln>
+            </p:spPr>
+            <p:style>
+              <a:lnRef idx="2">
+                <a:schemeClr val="accent1">
+                  <a:shade val="50000"/>
+                </a:schemeClr>
+              </a:lnRef>
+              <a:fillRef idx="1">
+                <a:schemeClr val="accent1"/>
+              </a:fillRef>
+              <a:effectRef idx="0">
+                <a:schemeClr val="accent1"/>
+              </a:effectRef>
+              <a:fontRef idx="minor">
+                <a:schemeClr val="lt1"/>
+              </a:fontRef>
+            </p:style>
+            <p:txBody>
+              <a:bodyPr rtlCol="0" anchor="ctr"/>
+              <a:lstStyle/>
+              <a:p>
+                <a:pPr algn="ctr"/>
+                <a:endParaRPr lang="en-US"/>
+              </a:p>
+            </p:txBody>
+          </p:sp>
+          <p:grpSp>
+            <p:nvGrpSpPr>
+              <p:cNvPr id="52" name="Group 51">
+                <a:extLst>
+                  <a:ext uri="{FF2B5EF4-FFF2-40B4-BE49-F238E27FC236}">
+                    <a16:creationId xmlns:a16="http://schemas.microsoft.com/office/drawing/2014/main" id="{0C520F56-1AD2-AE7D-218C-F9011FB8F13D}"/>
+                  </a:ext>
+                </a:extLst>
+              </p:cNvPr>
+              <p:cNvGrpSpPr/>
+              <p:nvPr/>
+            </p:nvGrpSpPr>
+            <p:grpSpPr>
+              <a:xfrm>
+                <a:off x="5084935" y="3833880"/>
+                <a:ext cx="685799" cy="1132965"/>
+                <a:chOff x="914401" y="3295366"/>
+                <a:chExt cx="972766" cy="1575881"/>
+              </a:xfrm>
+              <a:solidFill>
+                <a:schemeClr val="bg1">
+                  <a:lumMod val="95000"/>
+                </a:schemeClr>
+              </a:solidFill>
+            </p:grpSpPr>
+            <p:sp>
+              <p:nvSpPr>
+                <p:cNvPr id="53" name="Oval 52">
+                  <a:extLst>
+                    <a:ext uri="{FF2B5EF4-FFF2-40B4-BE49-F238E27FC236}">
+                      <a16:creationId xmlns:a16="http://schemas.microsoft.com/office/drawing/2014/main" id="{F3623849-3097-5B53-F2D6-9E4C5AA89C7E}"/>
+                    </a:ext>
+                  </a:extLst>
+                </p:cNvPr>
+                <p:cNvSpPr/>
+                <p:nvPr/>
+              </p:nvSpPr>
+              <p:spPr>
+                <a:xfrm>
+                  <a:off x="1035024" y="3295366"/>
+                  <a:ext cx="731520" cy="731520"/>
+                </a:xfrm>
+                <a:prstGeom prst="ellipse">
+                  <a:avLst/>
+                </a:prstGeom>
+                <a:grpFill/>
+                <a:ln>
+                  <a:solidFill>
+                    <a:schemeClr val="tx1"/>
+                  </a:solidFill>
+                </a:ln>
+              </p:spPr>
+              <p:style>
+                <a:lnRef idx="2">
+                  <a:schemeClr val="accent1">
+                    <a:shade val="50000"/>
+                  </a:schemeClr>
+                </a:lnRef>
+                <a:fillRef idx="1">
+                  <a:schemeClr val="accent1"/>
+                </a:fillRef>
+                <a:effectRef idx="0">
+                  <a:schemeClr val="accent1"/>
+                </a:effectRef>
+                <a:fontRef idx="minor">
+                  <a:schemeClr val="lt1"/>
+                </a:fontRef>
+              </p:style>
+              <p:txBody>
+                <a:bodyPr rtlCol="0" anchor="ctr"/>
+                <a:lstStyle/>
+                <a:p>
+                  <a:pPr algn="ctr"/>
+                  <a:endParaRPr lang="en-US"/>
+                </a:p>
+              </p:txBody>
+            </p:sp>
+            <p:sp>
+              <p:nvSpPr>
+                <p:cNvPr id="54" name="Round Same Side Corner Rectangle 53">
+                  <a:extLst>
+                    <a:ext uri="{FF2B5EF4-FFF2-40B4-BE49-F238E27FC236}">
+                      <a16:creationId xmlns:a16="http://schemas.microsoft.com/office/drawing/2014/main" id="{C938ED44-745E-418C-8328-C8F17F58B97E}"/>
+                    </a:ext>
+                  </a:extLst>
+                </p:cNvPr>
+                <p:cNvSpPr/>
+                <p:nvPr/>
+              </p:nvSpPr>
+              <p:spPr>
+                <a:xfrm>
+                  <a:off x="914401" y="4026886"/>
+                  <a:ext cx="972766" cy="844361"/>
+                </a:xfrm>
+                <a:prstGeom prst="round2SameRect">
+                  <a:avLst>
+                    <a:gd name="adj1" fmla="val 50000"/>
+                    <a:gd name="adj2" fmla="val 0"/>
+                  </a:avLst>
+                </a:prstGeom>
+                <a:grpFill/>
+                <a:ln>
+                  <a:solidFill>
+                    <a:schemeClr val="tx1"/>
+                  </a:solidFill>
+                </a:ln>
+              </p:spPr>
+              <p:style>
+                <a:lnRef idx="2">
+                  <a:schemeClr val="accent1">
+                    <a:shade val="50000"/>
+                  </a:schemeClr>
+                </a:lnRef>
+                <a:fillRef idx="1">
+                  <a:schemeClr val="accent1"/>
+                </a:fillRef>
+                <a:effectRef idx="0">
+                  <a:schemeClr val="accent1"/>
+                </a:effectRef>
+                <a:fontRef idx="minor">
+                  <a:schemeClr val="lt1"/>
+                </a:fontRef>
+              </p:style>
+              <p:txBody>
+                <a:bodyPr rtlCol="0" anchor="ctr"/>
+                <a:lstStyle/>
+                <a:p>
+                  <a:pPr algn="ctr"/>
+                  <a:endParaRPr lang="en-US"/>
+                </a:p>
+              </p:txBody>
+            </p:sp>
+          </p:grpSp>
+          <p:sp>
+            <p:nvSpPr>
+              <p:cNvPr id="55" name="Oval 54">
+                <a:extLst>
+                  <a:ext uri="{FF2B5EF4-FFF2-40B4-BE49-F238E27FC236}">
+                    <a16:creationId xmlns:a16="http://schemas.microsoft.com/office/drawing/2014/main" id="{F9160F52-CEB4-462A-59A4-4E9F79038D9E}"/>
+                  </a:ext>
+                </a:extLst>
+              </p:cNvPr>
+              <p:cNvSpPr/>
+              <p:nvPr/>
+            </p:nvSpPr>
+            <p:spPr>
+              <a:xfrm>
+                <a:off x="5388857" y="4039120"/>
+                <a:ext cx="45720" cy="45720"/>
+              </a:xfrm>
+              <a:prstGeom prst="ellipse">
+                <a:avLst/>
+              </a:prstGeom>
+              <a:solidFill>
+                <a:schemeClr val="tx1"/>
+              </a:solidFill>
+              <a:ln>
+                <a:solidFill>
+                  <a:schemeClr val="tx1"/>
+                </a:solidFill>
+              </a:ln>
+            </p:spPr>
+            <p:style>
+              <a:lnRef idx="2">
+                <a:schemeClr val="accent1">
+                  <a:shade val="50000"/>
+                </a:schemeClr>
+              </a:lnRef>
+              <a:fillRef idx="1">
+                <a:schemeClr val="accent1"/>
+              </a:fillRef>
+              <a:effectRef idx="0">
+                <a:schemeClr val="accent1"/>
+              </a:effectRef>
+              <a:fontRef idx="minor">
+                <a:schemeClr val="lt1"/>
+              </a:fontRef>
+            </p:style>
+            <p:txBody>
+              <a:bodyPr rtlCol="0" anchor="ctr"/>
+              <a:lstStyle/>
+              <a:p>
+                <a:pPr algn="ctr"/>
+                <a:endParaRPr lang="en-US"/>
+              </a:p>
+            </p:txBody>
+          </p:sp>
+          <p:sp>
+            <p:nvSpPr>
+              <p:cNvPr id="56" name="Oval 55">
+                <a:extLst>
+                  <a:ext uri="{FF2B5EF4-FFF2-40B4-BE49-F238E27FC236}">
+                    <a16:creationId xmlns:a16="http://schemas.microsoft.com/office/drawing/2014/main" id="{B628BBD9-7D21-B7D5-EC26-DCC54C20CF10}"/>
+                  </a:ext>
+                </a:extLst>
+              </p:cNvPr>
+              <p:cNvSpPr/>
+              <p:nvPr/>
+            </p:nvSpPr>
+            <p:spPr>
+              <a:xfrm>
+                <a:off x="5234597" y="4029827"/>
+                <a:ext cx="45720" cy="45720"/>
+              </a:xfrm>
+              <a:prstGeom prst="ellipse">
+                <a:avLst/>
+              </a:prstGeom>
+              <a:solidFill>
+                <a:schemeClr val="tx1"/>
+              </a:solidFill>
+              <a:ln>
+                <a:solidFill>
+                  <a:schemeClr val="tx1"/>
+                </a:solidFill>
+              </a:ln>
+            </p:spPr>
+            <p:style>
+              <a:lnRef idx="2">
+                <a:schemeClr val="accent1">
+                  <a:shade val="50000"/>
+                </a:schemeClr>
+              </a:lnRef>
+              <a:fillRef idx="1">
+                <a:schemeClr val="accent1"/>
+              </a:fillRef>
+              <a:effectRef idx="0">
+                <a:schemeClr val="accent1"/>
+              </a:effectRef>
+              <a:fontRef idx="minor">
+                <a:schemeClr val="lt1"/>
+              </a:fontRef>
+            </p:style>
+            <p:txBody>
+              <a:bodyPr rtlCol="0" anchor="ctr"/>
+              <a:lstStyle/>
+              <a:p>
+                <a:pPr algn="ctr"/>
+                <a:endParaRPr lang="en-US"/>
+              </a:p>
+            </p:txBody>
+          </p:sp>
+          <p:sp>
+            <p:nvSpPr>
+              <p:cNvPr id="58" name="TextBox 57">
+                <a:extLst>
+                  <a:ext uri="{FF2B5EF4-FFF2-40B4-BE49-F238E27FC236}">
+                    <a16:creationId xmlns:a16="http://schemas.microsoft.com/office/drawing/2014/main" id="{D0F2D3D6-DC37-9741-4091-C3404CAD9972}"/>
+                  </a:ext>
+                </a:extLst>
+              </p:cNvPr>
+              <p:cNvSpPr txBox="1"/>
+              <p:nvPr/>
+            </p:nvSpPr>
+            <p:spPr>
+              <a:xfrm>
+                <a:off x="3753748" y="1975667"/>
+                <a:ext cx="3242697" cy="1200329"/>
+              </a:xfrm>
+              <a:prstGeom prst="rect">
+                <a:avLst/>
+              </a:prstGeom>
+              <a:noFill/>
+            </p:spPr>
+            <p:txBody>
+              <a:bodyPr wrap="square" rtlCol="0">
+                <a:spAutoFit/>
+              </a:bodyPr>
+              <a:lstStyle/>
+              <a:p>
+                <a:pPr algn="ctr"/>
+                <a:r>
+                  <a:rPr lang="en-US" sz="2400" dirty="0">
+                    <a:latin typeface="Franklin Gothic Book" panose="020B0503020102020204" pitchFamily="34" charset="0"/>
+                  </a:rPr>
+                  <a:t>Observers assume </a:t>
+                </a:r>
+              </a:p>
+              <a:p>
+                <a:pPr algn="ctr"/>
+                <a:r>
+                  <a:rPr lang="en-US" sz="2400" dirty="0">
+                    <a:solidFill>
+                      <a:schemeClr val="accent2">
+                        <a:lumMod val="75000"/>
+                      </a:schemeClr>
+                    </a:solidFill>
+                    <a:latin typeface="Franklin Gothic Book" panose="020B0503020102020204" pitchFamily="34" charset="0"/>
+                  </a:rPr>
+                  <a:t>genuine</a:t>
+                </a:r>
+                <a:r>
+                  <a:rPr lang="en-US" sz="2400" dirty="0">
+                    <a:latin typeface="Franklin Gothic Book" panose="020B0503020102020204" pitchFamily="34" charset="0"/>
+                  </a:rPr>
+                  <a:t> </a:t>
+                </a:r>
+              </a:p>
+              <a:p>
+                <a:pPr algn="ctr"/>
+                <a:r>
+                  <a:rPr lang="en-US" sz="2400" dirty="0">
+                    <a:latin typeface="Franklin Gothic Book" panose="020B0503020102020204" pitchFamily="34" charset="0"/>
+                  </a:rPr>
+                  <a:t>incompetence</a:t>
+                </a:r>
+              </a:p>
+            </p:txBody>
+          </p:sp>
+          <p:sp>
+            <p:nvSpPr>
+              <p:cNvPr id="74" name="TextBox 73">
+                <a:extLst>
+                  <a:ext uri="{FF2B5EF4-FFF2-40B4-BE49-F238E27FC236}">
+                    <a16:creationId xmlns:a16="http://schemas.microsoft.com/office/drawing/2014/main" id="{736074A5-9C53-1AAA-DCC0-7A13897DF2E8}"/>
+                  </a:ext>
+                </a:extLst>
+              </p:cNvPr>
+              <p:cNvSpPr txBox="1"/>
+              <p:nvPr/>
+            </p:nvSpPr>
+            <p:spPr>
+              <a:xfrm>
+                <a:off x="723576" y="2661629"/>
+                <a:ext cx="1687000" cy="461665"/>
+              </a:xfrm>
+              <a:prstGeom prst="rect">
+                <a:avLst/>
+              </a:prstGeom>
+              <a:noFill/>
+            </p:spPr>
+            <p:txBody>
+              <a:bodyPr wrap="none" rtlCol="0">
+                <a:spAutoFit/>
+              </a:bodyPr>
+              <a:lstStyle/>
+              <a:p>
+                <a:r>
+                  <a:rPr lang="en-US" sz="2400" dirty="0">
+                    <a:solidFill>
+                      <a:srgbClr val="C00000"/>
+                    </a:solidFill>
+                    <a:latin typeface="Franklin Gothic Book" panose="020B0503020102020204" pitchFamily="34" charset="0"/>
+                  </a:rPr>
+                  <a:t>stereotypes</a:t>
+                </a:r>
+                <a:endParaRPr lang="en-US" sz="2400" dirty="0"/>
+              </a:p>
+            </p:txBody>
+          </p:sp>
+          <p:sp>
+            <p:nvSpPr>
+              <p:cNvPr id="75" name="TextBox 74">
+                <a:extLst>
+                  <a:ext uri="{FF2B5EF4-FFF2-40B4-BE49-F238E27FC236}">
+                    <a16:creationId xmlns:a16="http://schemas.microsoft.com/office/drawing/2014/main" id="{19FE2C2B-C18F-DD28-4FBF-292043943D1B}"/>
+                  </a:ext>
+                </a:extLst>
+              </p:cNvPr>
+              <p:cNvSpPr txBox="1"/>
+              <p:nvPr/>
+            </p:nvSpPr>
+            <p:spPr>
+              <a:xfrm>
+                <a:off x="1108903" y="2340610"/>
+                <a:ext cx="1003929" cy="461665"/>
+              </a:xfrm>
+              <a:prstGeom prst="rect">
+                <a:avLst/>
+              </a:prstGeom>
+              <a:noFill/>
+            </p:spPr>
+            <p:txBody>
+              <a:bodyPr wrap="none" rtlCol="0">
+                <a:spAutoFit/>
+              </a:bodyPr>
+              <a:lstStyle/>
+              <a:p>
+                <a:r>
+                  <a:rPr lang="en-US" sz="2400" dirty="0">
+                    <a:latin typeface="Franklin Gothic Book" panose="020B0503020102020204" pitchFamily="34" charset="0"/>
+                  </a:rPr>
+                  <a:t>due to</a:t>
+                </a:r>
+                <a:endParaRPr lang="en-US" sz="2400" dirty="0"/>
+              </a:p>
+            </p:txBody>
+          </p:sp>
+        </p:grpSp>
+      </p:grpSp>
+    </p:spTree>
+    <p:extLst>
+      <p:ext uri="{BB962C8B-B14F-4D97-AF65-F5344CB8AC3E}">
+        <p14:creationId xmlns:p14="http://schemas.microsoft.com/office/powerpoint/2010/main" val="393589692"/>
+      </p:ext>
+    </p:extLst>
+  </p:cSld>
+  <p:clrMapOvr>
+    <a:masterClrMapping/>
+  </p:clrMapOvr>
+</p:sld>
+</file>
+
 <file path=ppt/theme/theme1.xml><?xml version="1.0" encoding="utf-8"?>
 <a:theme xmlns:a="http://schemas.openxmlformats.org/drawingml/2006/main" name="Office Theme">
   <a:themeElements>

</xml_diff>